<commit_message>
1.3 and 1.4 slides
</commit_message>
<xml_diff>
--- a/angular/slides/Video 1.3 - Slides.pptx
+++ b/angular/slides/Video 1.3 - Slides.pptx
@@ -15957,7 +15957,7 @@
           <p:cNvPr id="3" name="Graphic 2" descr="Clipboard">
             <a:extLst>
               <a:ext uri="{FF2B5EF4-FFF2-40B4-BE49-F238E27FC236}">
-                <a16:creationId xmlns:a16="http://schemas.microsoft.com/office/drawing/2014/main" xmlns="" id="{E71F4959-BCBD-4B9F-B0BB-86D031A5FDB4}"/>
+                <a16:creationId xmlns="" xmlns:a16="http://schemas.microsoft.com/office/drawing/2014/main" id="{E71F4959-BCBD-4B9F-B0BB-86D031A5FDB4}"/>
               </a:ext>
             </a:extLst>
           </p:cNvPr>
@@ -15970,7 +15970,7 @@
           <a:blip r:embed="rId3">
             <a:extLst>
               <a:ext uri="{96DAC541-7B7A-43D3-8B79-37D633B846F1}">
-                <asvg:svgBlip xmlns:asvg="http://schemas.microsoft.com/office/drawing/2016/SVG/main" xmlns="" r:embed="rId4"/>
+                <asvg:svgBlip xmlns="" xmlns:asvg="http://schemas.microsoft.com/office/drawing/2016/SVG/main" r:embed="rId4"/>
               </a:ext>
             </a:extLst>
           </a:blip>
@@ -15993,7 +15993,7 @@
           <p:cNvPr id="4" name="TextBox 3">
             <a:extLst>
               <a:ext uri="{FF2B5EF4-FFF2-40B4-BE49-F238E27FC236}">
-                <a16:creationId xmlns:a16="http://schemas.microsoft.com/office/drawing/2014/main" xmlns="" id="{CA240F90-FC47-4ED2-B656-3D74496177B9}"/>
+                <a16:creationId xmlns="" xmlns:a16="http://schemas.microsoft.com/office/drawing/2014/main" id="{CA240F90-FC47-4ED2-B656-3D74496177B9}"/>
               </a:ext>
             </a:extLst>
           </p:cNvPr>
@@ -16314,7 +16314,7 @@
           <p:cNvPr id="3" name="Graphic 2" descr="Checklist">
             <a:extLst>
               <a:ext uri="{FF2B5EF4-FFF2-40B4-BE49-F238E27FC236}">
-                <a16:creationId xmlns:a16="http://schemas.microsoft.com/office/drawing/2014/main" xmlns="" id="{B9DC830F-10B5-43B8-BAA1-BA4C6D0BD53E}"/>
+                <a16:creationId xmlns="" xmlns:a16="http://schemas.microsoft.com/office/drawing/2014/main" id="{B9DC830F-10B5-43B8-BAA1-BA4C6D0BD53E}"/>
               </a:ext>
             </a:extLst>
           </p:cNvPr>
@@ -16327,7 +16327,7 @@
           <a:blip r:embed="rId3">
             <a:extLst>
               <a:ext uri="{96DAC541-7B7A-43D3-8B79-37D633B846F1}">
-                <asvg:svgBlip xmlns:asvg="http://schemas.microsoft.com/office/drawing/2016/SVG/main" xmlns="" r:embed="rId4"/>
+                <asvg:svgBlip xmlns="" xmlns:asvg="http://schemas.microsoft.com/office/drawing/2016/SVG/main" r:embed="rId4"/>
               </a:ext>
             </a:extLst>
           </a:blip>
@@ -16350,7 +16350,7 @@
           <p:cNvPr id="7" name="TextBox 6">
             <a:extLst>
               <a:ext uri="{FF2B5EF4-FFF2-40B4-BE49-F238E27FC236}">
-                <a16:creationId xmlns:a16="http://schemas.microsoft.com/office/drawing/2014/main" xmlns="" id="{CA240F90-FC47-4ED2-B656-3D74496177B9}"/>
+                <a16:creationId xmlns="" xmlns:a16="http://schemas.microsoft.com/office/drawing/2014/main" id="{CA240F90-FC47-4ED2-B656-3D74496177B9}"/>
               </a:ext>
             </a:extLst>
           </p:cNvPr>
@@ -16602,8 +16602,16 @@
               <a:buSzPct val="25000"/>
             </a:pPr>
             <a:r>
+              <a:rPr lang="en-IN" dirty="0" smtClean="0"/>
+              <a:t>Learn </a:t>
+            </a:r>
+            <a:r>
+              <a:rPr lang="en-IN" smtClean="0"/>
+              <a:t>about Collections </a:t>
+            </a:r>
+            <a:r>
               <a:rPr lang="en-IN" dirty="0"/>
-              <a:t>Learn about Arrays and Loops in JavaScript</a:t>
+              <a:t>in JavaScript</a:t>
             </a:r>
             <a:endParaRPr lang="en" dirty="0"/>
           </a:p>

</xml_diff>